<commit_message>
updated m2 marking procedure to only one arena
updated m2 marking procedure to only one arena
</commit_message>
<xml_diff>
--- a/Week05-06/M3_slides/Lab3_1.pptx
+++ b/Week05-06/M3_slides/Lab3_1.pptx
@@ -291,7 +291,7 @@
           <a:p>
             <a:fld id="{1205BC88-DBF0-4610-A802-A09E0A6ECD22}" type="datetimeFigureOut">
               <a:rPr lang="en-AU" smtClean="0"/>
-              <a:t>17/08/2024</a:t>
+              <a:t>18/08/2024</a:t>
             </a:fld>
             <a:endParaRPr lang="en-AU"/>
           </a:p>
@@ -519,7 +519,7 @@
           <a:p>
             <a:fld id="{1205BC88-DBF0-4610-A802-A09E0A6ECD22}" type="datetimeFigureOut">
               <a:rPr lang="en-AU" smtClean="0"/>
-              <a:t>17/08/2024</a:t>
+              <a:t>18/08/2024</a:t>
             </a:fld>
             <a:endParaRPr lang="en-AU"/>
           </a:p>
@@ -699,7 +699,7 @@
           <a:p>
             <a:fld id="{1205BC88-DBF0-4610-A802-A09E0A6ECD22}" type="datetimeFigureOut">
               <a:rPr lang="en-AU" smtClean="0"/>
-              <a:t>17/08/2024</a:t>
+              <a:t>18/08/2024</a:t>
             </a:fld>
             <a:endParaRPr lang="en-AU"/>
           </a:p>
@@ -869,7 +869,7 @@
           <a:p>
             <a:fld id="{1205BC88-DBF0-4610-A802-A09E0A6ECD22}" type="datetimeFigureOut">
               <a:rPr lang="en-AU" smtClean="0"/>
-              <a:t>17/08/2024</a:t>
+              <a:t>18/08/2024</a:t>
             </a:fld>
             <a:endParaRPr lang="en-AU"/>
           </a:p>
@@ -1123,7 +1123,7 @@
           <a:p>
             <a:fld id="{1205BC88-DBF0-4610-A802-A09E0A6ECD22}" type="datetimeFigureOut">
               <a:rPr lang="en-AU" smtClean="0"/>
-              <a:t>17/08/2024</a:t>
+              <a:t>18/08/2024</a:t>
             </a:fld>
             <a:endParaRPr lang="en-AU"/>
           </a:p>
@@ -1449,7 +1449,7 @@
           <a:p>
             <a:fld id="{1205BC88-DBF0-4610-A802-A09E0A6ECD22}" type="datetimeFigureOut">
               <a:rPr lang="en-AU" smtClean="0"/>
-              <a:t>17/08/2024</a:t>
+              <a:t>18/08/2024</a:t>
             </a:fld>
             <a:endParaRPr lang="en-AU"/>
           </a:p>
@@ -1900,7 +1900,7 @@
           <a:p>
             <a:fld id="{1205BC88-DBF0-4610-A802-A09E0A6ECD22}" type="datetimeFigureOut">
               <a:rPr lang="en-AU" smtClean="0"/>
-              <a:t>17/08/2024</a:t>
+              <a:t>18/08/2024</a:t>
             </a:fld>
             <a:endParaRPr lang="en-AU"/>
           </a:p>
@@ -2018,7 +2018,7 @@
           <a:p>
             <a:fld id="{1205BC88-DBF0-4610-A802-A09E0A6ECD22}" type="datetimeFigureOut">
               <a:rPr lang="en-AU" smtClean="0"/>
-              <a:t>17/08/2024</a:t>
+              <a:t>18/08/2024</a:t>
             </a:fld>
             <a:endParaRPr lang="en-AU"/>
           </a:p>
@@ -2113,7 +2113,7 @@
           <a:p>
             <a:fld id="{1205BC88-DBF0-4610-A802-A09E0A6ECD22}" type="datetimeFigureOut">
               <a:rPr lang="en-AU" smtClean="0"/>
-              <a:t>17/08/2024</a:t>
+              <a:t>18/08/2024</a:t>
             </a:fld>
             <a:endParaRPr lang="en-AU"/>
           </a:p>
@@ -2400,7 +2400,7 @@
           <a:p>
             <a:fld id="{1205BC88-DBF0-4610-A802-A09E0A6ECD22}" type="datetimeFigureOut">
               <a:rPr lang="en-AU" smtClean="0"/>
-              <a:t>17/08/2024</a:t>
+              <a:t>18/08/2024</a:t>
             </a:fld>
             <a:endParaRPr lang="en-AU"/>
           </a:p>
@@ -2722,7 +2722,7 @@
           <a:p>
             <a:fld id="{1205BC88-DBF0-4610-A802-A09E0A6ECD22}" type="datetimeFigureOut">
               <a:rPr lang="en-AU" smtClean="0"/>
-              <a:t>17/08/2024</a:t>
+              <a:t>18/08/2024</a:t>
             </a:fld>
             <a:endParaRPr lang="en-AU"/>
           </a:p>
@@ -2976,7 +2976,7 @@
           <a:p>
             <a:fld id="{1205BC88-DBF0-4610-A802-A09E0A6ECD22}" type="datetimeFigureOut">
               <a:rPr lang="en-AU" smtClean="0"/>
-              <a:t>17/08/2024</a:t>
+              <a:t>18/08/2024</a:t>
             </a:fld>
             <a:endParaRPr lang="en-AU"/>
           </a:p>
@@ -4159,7 +4159,7 @@
         <p:spPr>
           <a:xfrm>
             <a:off x="478180" y="1003554"/>
-            <a:ext cx="10692328" cy="5355312"/>
+            <a:ext cx="10692328" cy="5078313"/>
           </a:xfrm>
           <a:prstGeom prst="rect">
             <a:avLst/>
@@ -4200,13 +4200,7 @@
           <a:p>
             <a:r>
               <a:rPr lang="en-US" dirty="0"/>
-              <a:t>There are two marking arenas running M2 marking in parallel. The groups will be marked in random order in one of the two marking arenas. </a:t>
-            </a:r>
-          </a:p>
-          <a:p>
-            <a:r>
-              <a:rPr lang="en-US" dirty="0"/>
-              <a:t>Don’t come to the marking arena unless it’s your group’s turn.</a:t>
+              <a:t>There will only be one marking arena running M2 marking. Don’t come to the marking arena unless it’s your group’s turn.</a:t>
             </a:r>
           </a:p>
           <a:p>

</xml_diff>

<commit_message>
Updated info in slides
</commit_message>
<xml_diff>
--- a/Week05-06/M3_slides/Lab3_1.pptx
+++ b/Week05-06/M3_slides/Lab3_1.pptx
@@ -17,6 +17,7 @@
     <p:sldId id="293" r:id="rId11"/>
     <p:sldId id="280" r:id="rId12"/>
     <p:sldId id="289" r:id="rId13"/>
+    <p:sldId id="294" r:id="rId14"/>
   </p:sldIdLst>
   <p:sldSz cx="12192000" cy="6858000"/>
   <p:notesSz cx="6858000" cy="9144000"/>
@@ -291,7 +292,7 @@
           <a:p>
             <a:fld id="{1205BC88-DBF0-4610-A802-A09E0A6ECD22}" type="datetimeFigureOut">
               <a:rPr lang="en-AU" smtClean="0"/>
-              <a:t>18/08/2024</a:t>
+              <a:t>20/8/2024</a:t>
             </a:fld>
             <a:endParaRPr lang="en-AU"/>
           </a:p>
@@ -519,7 +520,7 @@
           <a:p>
             <a:fld id="{1205BC88-DBF0-4610-A802-A09E0A6ECD22}" type="datetimeFigureOut">
               <a:rPr lang="en-AU" smtClean="0"/>
-              <a:t>18/08/2024</a:t>
+              <a:t>20/8/2024</a:t>
             </a:fld>
             <a:endParaRPr lang="en-AU"/>
           </a:p>
@@ -699,7 +700,7 @@
           <a:p>
             <a:fld id="{1205BC88-DBF0-4610-A802-A09E0A6ECD22}" type="datetimeFigureOut">
               <a:rPr lang="en-AU" smtClean="0"/>
-              <a:t>18/08/2024</a:t>
+              <a:t>20/8/2024</a:t>
             </a:fld>
             <a:endParaRPr lang="en-AU"/>
           </a:p>
@@ -869,7 +870,7 @@
           <a:p>
             <a:fld id="{1205BC88-DBF0-4610-A802-A09E0A6ECD22}" type="datetimeFigureOut">
               <a:rPr lang="en-AU" smtClean="0"/>
-              <a:t>18/08/2024</a:t>
+              <a:t>20/8/2024</a:t>
             </a:fld>
             <a:endParaRPr lang="en-AU"/>
           </a:p>
@@ -1123,7 +1124,7 @@
           <a:p>
             <a:fld id="{1205BC88-DBF0-4610-A802-A09E0A6ECD22}" type="datetimeFigureOut">
               <a:rPr lang="en-AU" smtClean="0"/>
-              <a:t>18/08/2024</a:t>
+              <a:t>20/8/2024</a:t>
             </a:fld>
             <a:endParaRPr lang="en-AU"/>
           </a:p>
@@ -1449,7 +1450,7 @@
           <a:p>
             <a:fld id="{1205BC88-DBF0-4610-A802-A09E0A6ECD22}" type="datetimeFigureOut">
               <a:rPr lang="en-AU" smtClean="0"/>
-              <a:t>18/08/2024</a:t>
+              <a:t>20/8/2024</a:t>
             </a:fld>
             <a:endParaRPr lang="en-AU"/>
           </a:p>
@@ -1900,7 +1901,7 @@
           <a:p>
             <a:fld id="{1205BC88-DBF0-4610-A802-A09E0A6ECD22}" type="datetimeFigureOut">
               <a:rPr lang="en-AU" smtClean="0"/>
-              <a:t>18/08/2024</a:t>
+              <a:t>20/8/2024</a:t>
             </a:fld>
             <a:endParaRPr lang="en-AU"/>
           </a:p>
@@ -2018,7 +2019,7 @@
           <a:p>
             <a:fld id="{1205BC88-DBF0-4610-A802-A09E0A6ECD22}" type="datetimeFigureOut">
               <a:rPr lang="en-AU" smtClean="0"/>
-              <a:t>18/08/2024</a:t>
+              <a:t>20/8/2024</a:t>
             </a:fld>
             <a:endParaRPr lang="en-AU"/>
           </a:p>
@@ -2113,7 +2114,7 @@
           <a:p>
             <a:fld id="{1205BC88-DBF0-4610-A802-A09E0A6ECD22}" type="datetimeFigureOut">
               <a:rPr lang="en-AU" smtClean="0"/>
-              <a:t>18/08/2024</a:t>
+              <a:t>20/8/2024</a:t>
             </a:fld>
             <a:endParaRPr lang="en-AU"/>
           </a:p>
@@ -2400,7 +2401,7 @@
           <a:p>
             <a:fld id="{1205BC88-DBF0-4610-A802-A09E0A6ECD22}" type="datetimeFigureOut">
               <a:rPr lang="en-AU" smtClean="0"/>
-              <a:t>18/08/2024</a:t>
+              <a:t>20/8/2024</a:t>
             </a:fld>
             <a:endParaRPr lang="en-AU"/>
           </a:p>
@@ -2722,7 +2723,7 @@
           <a:p>
             <a:fld id="{1205BC88-DBF0-4610-A802-A09E0A6ECD22}" type="datetimeFigureOut">
               <a:rPr lang="en-AU" smtClean="0"/>
-              <a:t>18/08/2024</a:t>
+              <a:t>20/8/2024</a:t>
             </a:fld>
             <a:endParaRPr lang="en-AU"/>
           </a:p>
@@ -2976,7 +2977,7 @@
           <a:p>
             <a:fld id="{1205BC88-DBF0-4610-A802-A09E0A6ECD22}" type="datetimeFigureOut">
               <a:rPr lang="en-AU" smtClean="0"/>
-              <a:t>18/08/2024</a:t>
+              <a:t>20/8/2024</a:t>
             </a:fld>
             <a:endParaRPr lang="en-AU"/>
           </a:p>
@@ -4021,7 +4022,7 @@
         <p:spPr>
           <a:xfrm>
             <a:off x="478180" y="806896"/>
-            <a:ext cx="11527007" cy="2862322"/>
+            <a:ext cx="11527007" cy="4524315"/>
           </a:xfrm>
           <a:prstGeom prst="rect">
             <a:avLst/>
@@ -4073,7 +4074,30 @@
           <a:p>
             <a:r>
               <a:rPr lang="en-US" dirty="0"/>
-              <a:t>Will talk more about these next week	 </a:t>
+              <a:t>Will talk more about these next week</a:t>
+            </a:r>
+          </a:p>
+          <a:p>
+            <a:endParaRPr lang="en-US" dirty="0"/>
+          </a:p>
+          <a:p>
+            <a:r>
+              <a:rPr lang="en-US" dirty="0"/>
+              <a:t>While you are waiting for your turn to be marked (or if you have already been marked), </a:t>
+            </a:r>
+            <a:r>
+              <a:rPr lang="en-US" b="1" dirty="0"/>
+              <a:t>please begin setting up your M3 work. </a:t>
+            </a:r>
+            <a:r>
+              <a:rPr lang="en-US" dirty="0"/>
+              <a:t>This may include tasks such as installing required dependencies, brainstorming with your team on how to approach the M3 problem, updating your team’s private git repository, etc.</a:t>
+            </a:r>
+          </a:p>
+          <a:p>
+            <a:r>
+              <a:rPr lang="en-US" dirty="0"/>
+              <a:t>	 </a:t>
             </a:r>
           </a:p>
         </p:txBody>
@@ -4158,8 +4182,8 @@
         </p:nvSpPr>
         <p:spPr>
           <a:xfrm>
-            <a:off x="478180" y="1003554"/>
-            <a:ext cx="10692328" cy="5078313"/>
+            <a:off x="478179" y="1015129"/>
+            <a:ext cx="11420595" cy="4247317"/>
           </a:xfrm>
           <a:prstGeom prst="rect">
             <a:avLst/>
@@ -4200,17 +4224,41 @@
           <a:p>
             <a:r>
               <a:rPr lang="en-US" dirty="0"/>
-              <a:t>There will only be one marking arena running M2 marking. Don’t come to the marking arena unless it’s your group’s turn.</a:t>
-            </a:r>
-          </a:p>
-          <a:p>
-            <a:endParaRPr lang="en-US" dirty="0"/>
+              <a:t>There will only be one marking arena running M2 marking.</a:t>
+            </a:r>
           </a:p>
           <a:p>
             <a:r>
               <a:rPr lang="en-US" dirty="0"/>
-              <a:t>You can perform as many runs as you like as long as you can finish within the time limit. Each run has a max of 3 allowed collisions. </a:t>
-            </a:r>
+              <a:t>You can perform as many runs as you like, as long as you can finish within the time limit.</a:t>
+            </a:r>
+          </a:p>
+          <a:p>
+            <a:r>
+              <a:rPr lang="en-US" dirty="0"/>
+              <a:t>Please do not loiter around the marking arena unless it’s your group’s turn.</a:t>
+            </a:r>
+          </a:p>
+          <a:p>
+            <a:r>
+              <a:rPr lang="en-US" dirty="0"/>
+              <a:t>You are only allowed to generate one SLAM map per run.</a:t>
+            </a:r>
+          </a:p>
+          <a:p>
+            <a:r>
+              <a:rPr lang="en-US" dirty="0"/>
+              <a:t>Each run has a max of 3 allowed collisions.</a:t>
+            </a:r>
+          </a:p>
+          <a:p>
+            <a:r>
+              <a:rPr lang="en-US" dirty="0"/>
+              <a:t>You must immediately start SLAM in the specified position and orientation marked in the arena.</a:t>
+            </a:r>
+          </a:p>
+          <a:p>
+            <a:endParaRPr lang="en-US" dirty="0"/>
           </a:p>
           <a:p>
             <a:r>
@@ -4223,74 +4271,6 @@
           </a:p>
           <a:p>
             <a:endParaRPr lang="en-US" dirty="0"/>
-          </a:p>
-          <a:p>
-            <a:r>
-              <a:rPr lang="en-US" dirty="0"/>
-              <a:t>We’ll mark all the generated SLAM maps you submit and take the best result for your M2 mark:</a:t>
-            </a:r>
-          </a:p>
-          <a:p>
-            <a:endParaRPr lang="en-US" dirty="0"/>
-          </a:p>
-          <a:p>
-            <a:r>
-              <a:rPr lang="en-US" dirty="0" err="1"/>
-              <a:t>slam_score</a:t>
-            </a:r>
-            <a:r>
-              <a:rPr lang="en-US" dirty="0"/>
-              <a:t> = ((0.12 - </a:t>
-            </a:r>
-            <a:r>
-              <a:rPr lang="en-US" dirty="0" err="1"/>
-              <a:t>Aligned_RMSE</a:t>
-            </a:r>
-            <a:r>
-              <a:rPr lang="en-US" dirty="0"/>
-              <a:t>)/(0.12 - 0.02)) x 80					(0 ≤ </a:t>
-            </a:r>
-            <a:r>
-              <a:rPr lang="en-US" dirty="0" err="1"/>
-              <a:t>slam_score</a:t>
-            </a:r>
-            <a:r>
-              <a:rPr lang="en-US" dirty="0"/>
-              <a:t> ≤ 80)</a:t>
-            </a:r>
-          </a:p>
-          <a:p>
-            <a:endParaRPr lang="en-US" dirty="0"/>
-          </a:p>
-          <a:p>
-            <a:r>
-              <a:rPr lang="en-US" dirty="0"/>
-              <a:t>Total M2 mark = </a:t>
-            </a:r>
-            <a:r>
-              <a:rPr lang="en-US" dirty="0" err="1"/>
-              <a:t>slam_score</a:t>
-            </a:r>
-            <a:r>
-              <a:rPr lang="en-US" dirty="0"/>
-              <a:t> + (</a:t>
-            </a:r>
-            <a:r>
-              <a:rPr lang="en-US" dirty="0" err="1"/>
-              <a:t>NumberOfFoundMarkers</a:t>
-            </a:r>
-            <a:r>
-              <a:rPr lang="en-US" dirty="0"/>
-              <a:t> x 2) - (</a:t>
-            </a:r>
-            <a:r>
-              <a:rPr lang="en-US" dirty="0" err="1"/>
-              <a:t>NumberOfCollidedMarkers</a:t>
-            </a:r>
-            <a:r>
-              <a:rPr lang="en-US" dirty="0"/>
-              <a:t> x 5)</a:t>
-            </a:r>
           </a:p>
         </p:txBody>
       </p:sp>
@@ -4298,6 +4278,185 @@
     <p:extLst>
       <p:ext uri="{BB962C8B-B14F-4D97-AF65-F5344CB8AC3E}">
         <p14:creationId xmlns:p14="http://schemas.microsoft.com/office/powerpoint/2010/main" val="864576379"/>
+      </p:ext>
+    </p:extLst>
+  </p:cSld>
+  <p:clrMapOvr>
+    <a:masterClrMapping/>
+  </p:clrMapOvr>
+</p:sld>
+</file>
+
+<file path=ppt/slides/slide13.xml><?xml version="1.0" encoding="utf-8"?>
+<p:sld xmlns:a="http://schemas.openxmlformats.org/drawingml/2006/main" xmlns:r="http://schemas.openxmlformats.org/officeDocument/2006/relationships" xmlns:p="http://schemas.openxmlformats.org/presentationml/2006/main">
+  <p:cSld>
+    <p:spTree>
+      <p:nvGrpSpPr>
+        <p:cNvPr id="1" name=""/>
+        <p:cNvGrpSpPr/>
+        <p:nvPr/>
+      </p:nvGrpSpPr>
+      <p:grpSpPr>
+        <a:xfrm>
+          <a:off x="0" y="0"/>
+          <a:ext cx="0" cy="0"/>
+          <a:chOff x="0" y="0"/>
+          <a:chExt cx="0" cy="0"/>
+        </a:xfrm>
+      </p:grpSpPr>
+      <p:sp>
+        <p:nvSpPr>
+          <p:cNvPr id="50" name="TextBox 49">
+            <a:extLst>
+              <a:ext uri="{FF2B5EF4-FFF2-40B4-BE49-F238E27FC236}">
+                <a16:creationId xmlns:a16="http://schemas.microsoft.com/office/drawing/2014/main" id="{BF948A99-782B-4139-A61F-6C2663DAEB76}"/>
+              </a:ext>
+            </a:extLst>
+          </p:cNvPr>
+          <p:cNvSpPr txBox="1"/>
+          <p:nvPr/>
+        </p:nvSpPr>
+        <p:spPr>
+          <a:xfrm>
+            <a:off x="478180" y="172557"/>
+            <a:ext cx="11713820" cy="830997"/>
+          </a:xfrm>
+          <a:prstGeom prst="rect">
+            <a:avLst/>
+          </a:prstGeom>
+          <a:noFill/>
+        </p:spPr>
+        <p:txBody>
+          <a:bodyPr wrap="square" rtlCol="0">
+            <a:spAutoFit/>
+          </a:bodyPr>
+          <a:lstStyle/>
+          <a:p>
+            <a:pPr algn="ctr"/>
+            <a:r>
+              <a:rPr lang="en-AU" sz="4800" dirty="0"/>
+              <a:t>M2 marking</a:t>
+            </a:r>
+          </a:p>
+        </p:txBody>
+      </p:sp>
+      <p:sp>
+        <p:nvSpPr>
+          <p:cNvPr id="4" name="TextBox 3">
+            <a:extLst>
+              <a:ext uri="{FF2B5EF4-FFF2-40B4-BE49-F238E27FC236}">
+                <a16:creationId xmlns:a16="http://schemas.microsoft.com/office/drawing/2014/main" id="{CA0B27D3-7B85-4485-A10E-AAC012A9B3BB}"/>
+              </a:ext>
+            </a:extLst>
+          </p:cNvPr>
+          <p:cNvSpPr txBox="1"/>
+          <p:nvPr/>
+        </p:nvSpPr>
+        <p:spPr>
+          <a:xfrm>
+            <a:off x="478179" y="1015129"/>
+            <a:ext cx="11420595" cy="2862322"/>
+          </a:xfrm>
+          <a:prstGeom prst="rect">
+            <a:avLst/>
+          </a:prstGeom>
+          <a:noFill/>
+        </p:spPr>
+        <p:txBody>
+          <a:bodyPr wrap="square" rtlCol="0">
+            <a:spAutoFit/>
+          </a:bodyPr>
+          <a:lstStyle/>
+          <a:p>
+            <a:endParaRPr lang="en-US" dirty="0"/>
+          </a:p>
+          <a:p>
+            <a:r>
+              <a:rPr lang="en-US" dirty="0"/>
+              <a:t>We’ll mark all the generated SLAM maps you submit and take the best result for your M2 mark:</a:t>
+            </a:r>
+          </a:p>
+          <a:p>
+            <a:endParaRPr lang="en-US" dirty="0"/>
+          </a:p>
+          <a:p>
+            <a:r>
+              <a:rPr lang="en-US" dirty="0" err="1"/>
+              <a:t>slam_score</a:t>
+            </a:r>
+            <a:r>
+              <a:rPr lang="en-US" dirty="0"/>
+              <a:t> = ((0.12 - </a:t>
+            </a:r>
+            <a:r>
+              <a:rPr lang="en-US" dirty="0" err="1"/>
+              <a:t>Aligned_RMSE</a:t>
+            </a:r>
+            <a:r>
+              <a:rPr lang="en-US" dirty="0"/>
+              <a:t>)/(0.12 - 0.02)) x 80					(0 ≤ </a:t>
+            </a:r>
+            <a:r>
+              <a:rPr lang="en-US" dirty="0" err="1"/>
+              <a:t>slam_score</a:t>
+            </a:r>
+            <a:r>
+              <a:rPr lang="en-US" dirty="0"/>
+              <a:t> ≤ 80)</a:t>
+            </a:r>
+          </a:p>
+          <a:p>
+            <a:endParaRPr lang="en-US" dirty="0"/>
+          </a:p>
+          <a:p>
+            <a:r>
+              <a:rPr lang="en-US" dirty="0"/>
+              <a:t>Total M2 mark = </a:t>
+            </a:r>
+            <a:r>
+              <a:rPr lang="en-US" dirty="0" err="1"/>
+              <a:t>slam_score</a:t>
+            </a:r>
+            <a:r>
+              <a:rPr lang="en-US" dirty="0"/>
+              <a:t> + (</a:t>
+            </a:r>
+            <a:r>
+              <a:rPr lang="en-US" dirty="0" err="1"/>
+              <a:t>NumberOfFoundMarkers</a:t>
+            </a:r>
+            <a:r>
+              <a:rPr lang="en-US" dirty="0"/>
+              <a:t> x 2) - (</a:t>
+            </a:r>
+            <a:r>
+              <a:rPr lang="en-US" dirty="0" err="1"/>
+              <a:t>NumberOfCollidedMarkers</a:t>
+            </a:r>
+            <a:r>
+              <a:rPr lang="en-US" dirty="0"/>
+              <a:t> x 5)</a:t>
+            </a:r>
+          </a:p>
+          <a:p>
+            <a:endParaRPr lang="en-US" dirty="0"/>
+          </a:p>
+          <a:p>
+            <a:r>
+              <a:rPr lang="en-US" b="1" dirty="0"/>
+              <a:t>Note: To reiterate from Week 3’s slides, you’ll need to make a visible effort to try and locate all 10 markers.</a:t>
+            </a:r>
+            <a:endParaRPr lang="en-US" dirty="0"/>
+          </a:p>
+          <a:p>
+            <a:endParaRPr lang="en-US" dirty="0"/>
+          </a:p>
+        </p:txBody>
+      </p:sp>
+    </p:spTree>
+    <p:extLst>
+      <p:ext uri="{BB962C8B-B14F-4D97-AF65-F5344CB8AC3E}">
+        <p14:creationId xmlns:p14="http://schemas.microsoft.com/office/powerpoint/2010/main" val="762226057"/>
       </p:ext>
     </p:extLst>
   </p:cSld>

</xml_diff>

<commit_message>
Bought fresh ingredients (updated potato)
Bought fresh ingredients (updated potato)
</commit_message>
<xml_diff>
--- a/Week05-06/M3_slides/Lab3_1.pptx
+++ b/Week05-06/M3_slides/Lab3_1.pptx
@@ -292,7 +292,7 @@
           <a:p>
             <a:fld id="{1205BC88-DBF0-4610-A802-A09E0A6ECD22}" type="datetimeFigureOut">
               <a:rPr lang="en-AU" smtClean="0"/>
-              <a:t>20/8/2024</a:t>
+              <a:t>22/08/2024</a:t>
             </a:fld>
             <a:endParaRPr lang="en-AU"/>
           </a:p>
@@ -520,7 +520,7 @@
           <a:p>
             <a:fld id="{1205BC88-DBF0-4610-A802-A09E0A6ECD22}" type="datetimeFigureOut">
               <a:rPr lang="en-AU" smtClean="0"/>
-              <a:t>20/8/2024</a:t>
+              <a:t>22/08/2024</a:t>
             </a:fld>
             <a:endParaRPr lang="en-AU"/>
           </a:p>
@@ -700,7 +700,7 @@
           <a:p>
             <a:fld id="{1205BC88-DBF0-4610-A802-A09E0A6ECD22}" type="datetimeFigureOut">
               <a:rPr lang="en-AU" smtClean="0"/>
-              <a:t>20/8/2024</a:t>
+              <a:t>22/08/2024</a:t>
             </a:fld>
             <a:endParaRPr lang="en-AU"/>
           </a:p>
@@ -870,7 +870,7 @@
           <a:p>
             <a:fld id="{1205BC88-DBF0-4610-A802-A09E0A6ECD22}" type="datetimeFigureOut">
               <a:rPr lang="en-AU" smtClean="0"/>
-              <a:t>20/8/2024</a:t>
+              <a:t>22/08/2024</a:t>
             </a:fld>
             <a:endParaRPr lang="en-AU"/>
           </a:p>
@@ -1124,7 +1124,7 @@
           <a:p>
             <a:fld id="{1205BC88-DBF0-4610-A802-A09E0A6ECD22}" type="datetimeFigureOut">
               <a:rPr lang="en-AU" smtClean="0"/>
-              <a:t>20/8/2024</a:t>
+              <a:t>22/08/2024</a:t>
             </a:fld>
             <a:endParaRPr lang="en-AU"/>
           </a:p>
@@ -1450,7 +1450,7 @@
           <a:p>
             <a:fld id="{1205BC88-DBF0-4610-A802-A09E0A6ECD22}" type="datetimeFigureOut">
               <a:rPr lang="en-AU" smtClean="0"/>
-              <a:t>20/8/2024</a:t>
+              <a:t>22/08/2024</a:t>
             </a:fld>
             <a:endParaRPr lang="en-AU"/>
           </a:p>
@@ -1901,7 +1901,7 @@
           <a:p>
             <a:fld id="{1205BC88-DBF0-4610-A802-A09E0A6ECD22}" type="datetimeFigureOut">
               <a:rPr lang="en-AU" smtClean="0"/>
-              <a:t>20/8/2024</a:t>
+              <a:t>22/08/2024</a:t>
             </a:fld>
             <a:endParaRPr lang="en-AU"/>
           </a:p>
@@ -2019,7 +2019,7 @@
           <a:p>
             <a:fld id="{1205BC88-DBF0-4610-A802-A09E0A6ECD22}" type="datetimeFigureOut">
               <a:rPr lang="en-AU" smtClean="0"/>
-              <a:t>20/8/2024</a:t>
+              <a:t>22/08/2024</a:t>
             </a:fld>
             <a:endParaRPr lang="en-AU"/>
           </a:p>
@@ -2114,7 +2114,7 @@
           <a:p>
             <a:fld id="{1205BC88-DBF0-4610-A802-A09E0A6ECD22}" type="datetimeFigureOut">
               <a:rPr lang="en-AU" smtClean="0"/>
-              <a:t>20/8/2024</a:t>
+              <a:t>22/08/2024</a:t>
             </a:fld>
             <a:endParaRPr lang="en-AU"/>
           </a:p>
@@ -2401,7 +2401,7 @@
           <a:p>
             <a:fld id="{1205BC88-DBF0-4610-A802-A09E0A6ECD22}" type="datetimeFigureOut">
               <a:rPr lang="en-AU" smtClean="0"/>
-              <a:t>20/8/2024</a:t>
+              <a:t>22/08/2024</a:t>
             </a:fld>
             <a:endParaRPr lang="en-AU"/>
           </a:p>
@@ -2723,7 +2723,7 @@
           <a:p>
             <a:fld id="{1205BC88-DBF0-4610-A802-A09E0A6ECD22}" type="datetimeFigureOut">
               <a:rPr lang="en-AU" smtClean="0"/>
-              <a:t>20/8/2024</a:t>
+              <a:t>22/08/2024</a:t>
             </a:fld>
             <a:endParaRPr lang="en-AU"/>
           </a:p>
@@ -2977,7 +2977,7 @@
           <a:p>
             <a:fld id="{1205BC88-DBF0-4610-A802-A09E0A6ECD22}" type="datetimeFigureOut">
               <a:rPr lang="en-AU" smtClean="0"/>
-              <a:t>20/8/2024</a:t>
+              <a:t>22/08/2024</a:t>
             </a:fld>
             <a:endParaRPr lang="en-AU"/>
           </a:p>
@@ -7037,7 +7037,7 @@
           <a:p>
             <a:r>
               <a:rPr lang="en-US" dirty="0"/>
-              <a:t>      lemon          pumpkin         tomato            pear          capsicum          garlic        plum           lime</a:t>
+              <a:t>      lemon          pumpkin         tomato      pear      capsicum   garlic        potato           lime</a:t>
             </a:r>
           </a:p>
           <a:p>
@@ -7076,32 +7076,49 @@
       </p:sp>
       <p:pic>
         <p:nvPicPr>
-          <p:cNvPr id="7" name="Picture 6">
+          <p:cNvPr id="1026" name="Picture 2">
             <a:extLst>
               <a:ext uri="{FF2B5EF4-FFF2-40B4-BE49-F238E27FC236}">
-                <a16:creationId xmlns:a16="http://schemas.microsoft.com/office/drawing/2014/main" id="{7E764C55-8BBD-D5D8-C41B-C98E1A9A8B36}"/>
+                <a16:creationId xmlns:a16="http://schemas.microsoft.com/office/drawing/2014/main" id="{45558A17-7453-48F7-5EBA-35AEF37B9484}"/>
               </a:ext>
             </a:extLst>
           </p:cNvPr>
           <p:cNvPicPr>
-            <a:picLocks noChangeAspect="1"/>
+            <a:picLocks noChangeAspect="1" noChangeArrowheads="1"/>
           </p:cNvPicPr>
           <p:nvPr/>
         </p:nvPicPr>
         <p:blipFill>
-          <a:blip r:embed="rId4"/>
+          <a:blip r:embed="rId4">
+            <a:extLst>
+              <a:ext uri="{28A0092B-C50C-407E-A947-70E740481C1C}">
+                <a14:useLocalDpi xmlns:a14="http://schemas.microsoft.com/office/drawing/2010/main" val="0"/>
+              </a:ext>
+            </a:extLst>
+          </a:blip>
+          <a:srcRect/>
           <a:stretch>
             <a:fillRect/>
           </a:stretch>
         </p:blipFill>
-        <p:spPr>
+        <p:spPr bwMode="auto">
           <a:xfrm>
-            <a:off x="711200" y="2955642"/>
-            <a:ext cx="10769600" cy="2447367"/>
+            <a:off x="891113" y="2717794"/>
+            <a:ext cx="9559636" cy="2846731"/>
           </a:xfrm>
           <a:prstGeom prst="rect">
             <a:avLst/>
           </a:prstGeom>
+          <a:noFill/>
+          <a:extLst>
+            <a:ext uri="{909E8E84-426E-40DD-AFC4-6F175D3DCCD1}">
+              <a14:hiddenFill xmlns:a14="http://schemas.microsoft.com/office/drawing/2010/main">
+                <a:solidFill>
+                  <a:srgbClr val="FFFFFF"/>
+                </a:solidFill>
+              </a14:hiddenFill>
+            </a:ext>
+          </a:extLst>
         </p:spPr>
       </p:pic>
     </p:spTree>

</xml_diff>